<commit_message>
Updated deck and ReadMe
</commit_message>
<xml_diff>
--- a/deck/M365DevProxy - Arjun Menon.pptx
+++ b/deck/M365DevProxy - Arjun Menon.pptx
@@ -5,10 +5,10 @@
     <p:sldMasterId id="2147483648" r:id="rId4"/>
   </p:sldMasterIdLst>
   <p:notesMasterIdLst>
-    <p:notesMasterId r:id="rId14"/>
+    <p:notesMasterId r:id="rId16"/>
   </p:notesMasterIdLst>
   <p:handoutMasterIdLst>
-    <p:handoutMasterId r:id="rId15"/>
+    <p:handoutMasterId r:id="rId17"/>
   </p:handoutMasterIdLst>
   <p:sldIdLst>
     <p:sldId id="1608" r:id="rId5"/>
@@ -19,7 +19,9 @@
     <p:sldId id="262" r:id="rId10"/>
     <p:sldId id="1594" r:id="rId11"/>
     <p:sldId id="1605" r:id="rId12"/>
-    <p:sldId id="264" r:id="rId13"/>
+    <p:sldId id="1610" r:id="rId13"/>
+    <p:sldId id="1609" r:id="rId14"/>
+    <p:sldId id="264" r:id="rId15"/>
   </p:sldIdLst>
   <p:sldSz cx="12192000" cy="6858000"/>
   <p:notesSz cx="6858000" cy="9144000"/>
@@ -223,7 +225,7 @@
           <a:p>
             <a:fld id="{2606C8FE-A40F-4EFA-9399-CBDFD77EB4EF}" type="datetimeFigureOut">
               <a:rPr lang="en-US" smtClean="0"/>
-              <a:t>11/21/24</a:t>
+              <a:t>11/27/24</a:t>
             </a:fld>
             <a:endParaRPr lang="en-US"/>
           </a:p>
@@ -400,7 +402,7 @@
           <a:p>
             <a:fld id="{DAFE1A50-ADA4-4343-9FD7-5307B4B307B5}" type="datetimeFigureOut">
               <a:rPr lang="en-US" smtClean="0"/>
-              <a:t>11/21/24</a:t>
+              <a:t>11/27/24</a:t>
             </a:fld>
             <a:endParaRPr lang="en-US"/>
           </a:p>
@@ -1438,7 +1440,7 @@
           <a:p>
             <a:fld id="{6D31EB7D-9C62-455A-A64E-330624384AE6}" type="datetimeFigureOut">
               <a:rPr lang="en-US" smtClean="0"/>
-              <a:t>11/21/24</a:t>
+              <a:t>11/27/24</a:t>
             </a:fld>
             <a:endParaRPr lang="en-US"/>
           </a:p>
@@ -1610,7 +1612,7 @@
           <a:p>
             <a:fld id="{6D31EB7D-9C62-455A-A64E-330624384AE6}" type="datetimeFigureOut">
               <a:rPr lang="en-US" smtClean="0"/>
-              <a:t>11/21/24</a:t>
+              <a:t>11/27/24</a:t>
             </a:fld>
             <a:endParaRPr lang="en-US"/>
           </a:p>
@@ -1747,7 +1749,7 @@
           <a:p>
             <a:fld id="{6D31EB7D-9C62-455A-A64E-330624384AE6}" type="datetimeFigureOut">
               <a:rPr lang="en-US" smtClean="0"/>
-              <a:t>11/21/24</a:t>
+              <a:t>11/27/24</a:t>
             </a:fld>
             <a:endParaRPr lang="en-US"/>
           </a:p>
@@ -2129,7 +2131,7 @@
             <a:fld id="{6D31EB7D-9C62-455A-A64E-330624384AE6}" type="datetimeFigureOut">
               <a:rPr lang="en-US" smtClean="0"/>
               <a:pPr/>
-              <a:t>11/21/24</a:t>
+              <a:t>11/27/24</a:t>
             </a:fld>
             <a:endParaRPr lang="en-US"/>
           </a:p>
@@ -2476,7 +2478,7 @@
             <a:fld id="{6D31EB7D-9C62-455A-A64E-330624384AE6}" type="datetimeFigureOut">
               <a:rPr lang="en-US" smtClean="0"/>
               <a:pPr/>
-              <a:t>11/21/24</a:t>
+              <a:t>11/27/24</a:t>
             </a:fld>
             <a:endParaRPr lang="en-US"/>
           </a:p>
@@ -2774,7 +2776,7 @@
             <a:fld id="{6D31EB7D-9C62-455A-A64E-330624384AE6}" type="datetimeFigureOut">
               <a:rPr lang="en-US" smtClean="0"/>
               <a:pPr/>
-              <a:t>11/21/24</a:t>
+              <a:t>11/27/24</a:t>
             </a:fld>
             <a:endParaRPr lang="en-US"/>
           </a:p>
@@ -3082,7 +3084,7 @@
             <a:fld id="{6D31EB7D-9C62-455A-A64E-330624384AE6}" type="datetimeFigureOut">
               <a:rPr lang="en-US" smtClean="0"/>
               <a:pPr/>
-              <a:t>11/21/24</a:t>
+              <a:t>11/27/24</a:t>
             </a:fld>
             <a:endParaRPr lang="en-US"/>
           </a:p>
@@ -5277,7 +5279,7 @@
           <a:p>
             <a:fld id="{6D31EB7D-9C62-455A-A64E-330624384AE6}" type="datetimeFigureOut">
               <a:rPr lang="en-US" smtClean="0"/>
-              <a:t>11/21/24</a:t>
+              <a:t>11/27/24</a:t>
             </a:fld>
             <a:endParaRPr lang="en-US"/>
           </a:p>
@@ -5581,7 +5583,7 @@
           <a:p>
             <a:fld id="{6D31EB7D-9C62-455A-A64E-330624384AE6}" type="datetimeFigureOut">
               <a:rPr lang="en-US" smtClean="0"/>
-              <a:t>11/21/24</a:t>
+              <a:t>11/27/24</a:t>
             </a:fld>
             <a:endParaRPr lang="en-US"/>
           </a:p>
@@ -5934,7 +5936,7 @@
           <a:p>
             <a:fld id="{6D31EB7D-9C62-455A-A64E-330624384AE6}" type="datetimeFigureOut">
               <a:rPr lang="en-US" smtClean="0"/>
-              <a:t>11/21/24</a:t>
+              <a:t>11/27/24</a:t>
             </a:fld>
             <a:endParaRPr lang="en-US"/>
           </a:p>
@@ -7062,6 +7064,205 @@
 </p:sld>
 </file>
 
+<file path=ppt/slides/slide10.xml><?xml version="1.0" encoding="utf-8"?>
+<p:sld xmlns:a="http://schemas.openxmlformats.org/drawingml/2006/main" xmlns:r="http://schemas.openxmlformats.org/officeDocument/2006/relationships" xmlns:p="http://schemas.openxmlformats.org/presentationml/2006/main">
+  <p:cSld>
+    <p:spTree>
+      <p:nvGrpSpPr>
+        <p:cNvPr id="1" name=""/>
+        <p:cNvGrpSpPr/>
+        <p:nvPr/>
+      </p:nvGrpSpPr>
+      <p:grpSpPr>
+        <a:xfrm>
+          <a:off x="0" y="0"/>
+          <a:ext cx="0" cy="0"/>
+          <a:chOff x="0" y="0"/>
+          <a:chExt cx="0" cy="0"/>
+        </a:xfrm>
+      </p:grpSpPr>
+      <p:sp>
+        <p:nvSpPr>
+          <p:cNvPr id="2" name="Title 1">
+            <a:extLst>
+              <a:ext uri="{FF2B5EF4-FFF2-40B4-BE49-F238E27FC236}">
+                <a16:creationId xmlns:a16="http://schemas.microsoft.com/office/drawing/2014/main" id="{7EF10920-D990-1D57-6501-16E36ED24B3C}"/>
+              </a:ext>
+            </a:extLst>
+          </p:cNvPr>
+          <p:cNvSpPr>
+            <a:spLocks noGrp="1"/>
+          </p:cNvSpPr>
+          <p:nvPr>
+            <p:ph type="title"/>
+          </p:nvPr>
+        </p:nvSpPr>
+        <p:spPr>
+          <a:xfrm>
+            <a:off x="839787" y="128788"/>
+            <a:ext cx="3932237" cy="576330"/>
+          </a:xfrm>
+        </p:spPr>
+        <p:txBody>
+          <a:bodyPr/>
+          <a:lstStyle/>
+          <a:p>
+            <a:r>
+              <a:rPr lang="en-US" dirty="0"/>
+              <a:t>Feedback</a:t>
+            </a:r>
+          </a:p>
+        </p:txBody>
+      </p:sp>
+      <p:sp>
+        <p:nvSpPr>
+          <p:cNvPr id="5" name="Text Placeholder 4">
+            <a:extLst>
+              <a:ext uri="{FF2B5EF4-FFF2-40B4-BE49-F238E27FC236}">
+                <a16:creationId xmlns:a16="http://schemas.microsoft.com/office/drawing/2014/main" id="{08C2879E-926D-B489-D2F6-DD7652FE82E0}"/>
+              </a:ext>
+            </a:extLst>
+          </p:cNvPr>
+          <p:cNvSpPr>
+            <a:spLocks noGrp="1"/>
+          </p:cNvSpPr>
+          <p:nvPr>
+            <p:ph type="body" sz="half" idx="2"/>
+          </p:nvPr>
+        </p:nvSpPr>
+        <p:spPr>
+          <a:xfrm>
+            <a:off x="556453" y="2730320"/>
+            <a:ext cx="4852674" cy="698679"/>
+          </a:xfrm>
+        </p:spPr>
+        <p:txBody>
+          <a:bodyPr>
+            <a:normAutofit/>
+          </a:bodyPr>
+          <a:lstStyle/>
+          <a:p>
+            <a:r>
+              <a:rPr lang="en-US" sz="2800" dirty="0"/>
+              <a:t>a-um.me/pune2024-repo</a:t>
+            </a:r>
+          </a:p>
+        </p:txBody>
+      </p:sp>
+      <p:pic>
+        <p:nvPicPr>
+          <p:cNvPr id="1028" name="Picture 4" descr="qr-code">
+            <a:extLst>
+              <a:ext uri="{FF2B5EF4-FFF2-40B4-BE49-F238E27FC236}">
+                <a16:creationId xmlns:a16="http://schemas.microsoft.com/office/drawing/2014/main" id="{5C2295F7-A514-4A3C-7D4E-81795F9EF0F9}"/>
+              </a:ext>
+            </a:extLst>
+          </p:cNvPr>
+          <p:cNvPicPr>
+            <a:picLocks noChangeAspect="1" noChangeArrowheads="1"/>
+          </p:cNvPicPr>
+          <p:nvPr/>
+        </p:nvPicPr>
+        <p:blipFill>
+          <a:blip r:embed="rId2">
+            <a:extLst>
+              <a:ext uri="{28A0092B-C50C-407E-A947-70E740481C1C}">
+                <a14:useLocalDpi xmlns:a14="http://schemas.microsoft.com/office/drawing/2010/main" val="0"/>
+              </a:ext>
+            </a:extLst>
+          </a:blip>
+          <a:srcRect/>
+          <a:stretch>
+            <a:fillRect/>
+          </a:stretch>
+        </p:blipFill>
+        <p:spPr bwMode="auto">
+          <a:xfrm>
+            <a:off x="5794607" y="1109726"/>
+            <a:ext cx="4638547" cy="4638547"/>
+          </a:xfrm>
+          <a:prstGeom prst="rect">
+            <a:avLst/>
+          </a:prstGeom>
+          <a:noFill/>
+          <a:extLst>
+            <a:ext uri="{909E8E84-426E-40DD-AFC4-6F175D3DCCD1}">
+              <a14:hiddenFill xmlns:a14="http://schemas.microsoft.com/office/drawing/2010/main">
+                <a:solidFill>
+                  <a:srgbClr val="FFFFFF"/>
+                </a:solidFill>
+              </a14:hiddenFill>
+            </a:ext>
+          </a:extLst>
+        </p:spPr>
+      </p:pic>
+    </p:spTree>
+    <p:extLst>
+      <p:ext uri="{BB962C8B-B14F-4D97-AF65-F5344CB8AC3E}">
+        <p14:creationId xmlns:p14="http://schemas.microsoft.com/office/powerpoint/2010/main" val="3779942629"/>
+      </p:ext>
+    </p:extLst>
+  </p:cSld>
+  <p:clrMapOvr>
+    <a:masterClrMapping/>
+  </p:clrMapOvr>
+  <mc:AlternateContent xmlns:mc="http://schemas.openxmlformats.org/markup-compatibility/2006">
+    <mc:Choice xmlns:p14="http://schemas.microsoft.com/office/powerpoint/2010/main" Requires="p14">
+      <p:transition spd="med" p14:dur="700">
+        <p:fade/>
+      </p:transition>
+    </mc:Choice>
+    <mc:Fallback>
+      <p:transition spd="med">
+        <p:fade/>
+      </p:transition>
+    </mc:Fallback>
+  </mc:AlternateContent>
+</p:sld>
+</file>
+
+<file path=ppt/slides/slide11.xml><?xml version="1.0" encoding="utf-8"?>
+<p:sld xmlns:a="http://schemas.openxmlformats.org/drawingml/2006/main" xmlns:r="http://schemas.openxmlformats.org/officeDocument/2006/relationships" xmlns:p="http://schemas.openxmlformats.org/presentationml/2006/main">
+  <p:cSld>
+    <p:spTree>
+      <p:nvGrpSpPr>
+        <p:cNvPr id="1" name=""/>
+        <p:cNvGrpSpPr/>
+        <p:nvPr/>
+      </p:nvGrpSpPr>
+      <p:grpSpPr>
+        <a:xfrm>
+          <a:off x="0" y="0"/>
+          <a:ext cx="0" cy="0"/>
+          <a:chOff x="0" y="0"/>
+          <a:chExt cx="0" cy="0"/>
+        </a:xfrm>
+      </p:grpSpPr>
+    </p:spTree>
+    <p:extLst>
+      <p:ext uri="{BB962C8B-B14F-4D97-AF65-F5344CB8AC3E}">
+        <p14:creationId xmlns:p14="http://schemas.microsoft.com/office/powerpoint/2010/main" val="1683390843"/>
+      </p:ext>
+    </p:extLst>
+  </p:cSld>
+  <p:clrMapOvr>
+    <a:masterClrMapping/>
+  </p:clrMapOvr>
+  <mc:AlternateContent xmlns:mc="http://schemas.openxmlformats.org/markup-compatibility/2006" xmlns:p14="http://schemas.microsoft.com/office/powerpoint/2010/main">
+    <mc:Choice Requires="p14">
+      <p:transition spd="med" p14:dur="700">
+        <p:fade/>
+      </p:transition>
+    </mc:Choice>
+    <mc:Fallback xmlns="">
+      <p:transition spd="med">
+        <p:fade/>
+      </p:transition>
+    </mc:Fallback>
+  </mc:AlternateContent>
+</p:sld>
+</file>
+
 <file path=ppt/slides/slide2.xml><?xml version="1.0" encoding="utf-8"?>
 <p:sld xmlns:a="http://schemas.openxmlformats.org/drawingml/2006/main" xmlns:r="http://schemas.openxmlformats.org/officeDocument/2006/relationships" xmlns:p="http://schemas.openxmlformats.org/presentationml/2006/main">
   <p:cSld>
@@ -7934,13 +8135,13 @@
   <p:clrMapOvr>
     <a:masterClrMapping/>
   </p:clrMapOvr>
-  <mc:AlternateContent xmlns:mc="http://schemas.openxmlformats.org/markup-compatibility/2006">
-    <mc:Choice xmlns:p14="http://schemas.microsoft.com/office/powerpoint/2010/main" Requires="p14">
+  <mc:AlternateContent xmlns:mc="http://schemas.openxmlformats.org/markup-compatibility/2006" xmlns:p14="http://schemas.microsoft.com/office/powerpoint/2010/main">
+    <mc:Choice Requires="p14">
       <p:transition spd="med" p14:dur="700">
         <p:fade/>
       </p:transition>
     </mc:Choice>
-    <mc:Fallback>
+    <mc:Fallback xmlns="">
       <p:transition spd="med">
         <p:fade/>
       </p:transition>
@@ -8402,28 +8603,298 @@
           <a:chExt cx="0" cy="0"/>
         </a:xfrm>
       </p:grpSpPr>
+      <p:sp>
+        <p:nvSpPr>
+          <p:cNvPr id="2" name="Title 1">
+            <a:extLst>
+              <a:ext uri="{FF2B5EF4-FFF2-40B4-BE49-F238E27FC236}">
+                <a16:creationId xmlns:a16="http://schemas.microsoft.com/office/drawing/2014/main" id="{5F83A395-4FCE-43CE-DEF5-0CFAD52FC927}"/>
+              </a:ext>
+            </a:extLst>
+          </p:cNvPr>
+          <p:cNvSpPr>
+            <a:spLocks noGrp="1"/>
+          </p:cNvSpPr>
+          <p:nvPr>
+            <p:ph type="title"/>
+          </p:nvPr>
+        </p:nvSpPr>
+        <p:spPr/>
+        <p:txBody>
+          <a:bodyPr/>
+          <a:lstStyle/>
+          <a:p>
+            <a:r>
+              <a:rPr lang="en-US" dirty="0"/>
+              <a:t>References</a:t>
+            </a:r>
+          </a:p>
+        </p:txBody>
+      </p:sp>
+      <p:graphicFrame>
+        <p:nvGraphicFramePr>
+          <p:cNvPr id="5" name="Content Placeholder 4">
+            <a:extLst>
+              <a:ext uri="{FF2B5EF4-FFF2-40B4-BE49-F238E27FC236}">
+                <a16:creationId xmlns:a16="http://schemas.microsoft.com/office/drawing/2014/main" id="{ACC904B9-033E-6D4E-5FF5-8CBD5DEFD349}"/>
+              </a:ext>
+            </a:extLst>
+          </p:cNvPr>
+          <p:cNvGraphicFramePr>
+            <a:graphicFrameLocks noGrp="1"/>
+          </p:cNvGraphicFramePr>
+          <p:nvPr>
+            <p:ph idx="1"/>
+            <p:extLst>
+              <p:ext uri="{D42A27DB-BD31-4B8C-83A1-F6EECF244321}">
+                <p14:modId xmlns:p14="http://schemas.microsoft.com/office/powerpoint/2010/main" val="980397498"/>
+              </p:ext>
+            </p:extLst>
+          </p:nvPr>
+        </p:nvGraphicFramePr>
+        <p:xfrm>
+          <a:off x="236539" y="1252538"/>
+          <a:ext cx="11739153" cy="4576962"/>
+        </p:xfrm>
+        <a:graphic>
+          <a:graphicData uri="http://schemas.openxmlformats.org/drawingml/2006/table">
+            <a:tbl>
+              <a:tblPr firstRow="1" bandRow="1">
+                <a:tableStyleId>{5C22544A-7EE6-4342-B048-85BDC9FD1C3A}</a:tableStyleId>
+              </a:tblPr>
+              <a:tblGrid>
+                <a:gridCol w="3913051">
+                  <a:extLst>
+                    <a:ext uri="{9D8B030D-6E8A-4147-A177-3AD203B41FA5}">
+                      <a16:colId xmlns:a16="http://schemas.microsoft.com/office/drawing/2014/main" val="2649664607"/>
+                    </a:ext>
+                  </a:extLst>
+                </a:gridCol>
+                <a:gridCol w="3913051">
+                  <a:extLst>
+                    <a:ext uri="{9D8B030D-6E8A-4147-A177-3AD203B41FA5}">
+                      <a16:colId xmlns:a16="http://schemas.microsoft.com/office/drawing/2014/main" val="1476336218"/>
+                    </a:ext>
+                  </a:extLst>
+                </a:gridCol>
+                <a:gridCol w="3913051">
+                  <a:extLst>
+                    <a:ext uri="{9D8B030D-6E8A-4147-A177-3AD203B41FA5}">
+                      <a16:colId xmlns:a16="http://schemas.microsoft.com/office/drawing/2014/main" val="2216335465"/>
+                    </a:ext>
+                  </a:extLst>
+                </a:gridCol>
+              </a:tblGrid>
+              <a:tr h="627777">
+                <a:tc>
+                  <a:txBody>
+                    <a:bodyPr/>
+                    <a:lstStyle/>
+                    <a:p>
+                      <a:pPr algn="ctr"/>
+                      <a:r>
+                        <a:rPr lang="en-US" sz="3600" dirty="0"/>
+                        <a:t>Reference</a:t>
+                      </a:r>
+                    </a:p>
+                  </a:txBody>
+                  <a:tcPr anchor="ctr"/>
+                </a:tc>
+                <a:tc>
+                  <a:txBody>
+                    <a:bodyPr/>
+                    <a:lstStyle/>
+                    <a:p>
+                      <a:pPr algn="ctr"/>
+                      <a:r>
+                        <a:rPr lang="en-US" sz="3600" dirty="0"/>
+                        <a:t>QR</a:t>
+                      </a:r>
+                    </a:p>
+                  </a:txBody>
+                  <a:tcPr anchor="ctr"/>
+                </a:tc>
+                <a:tc>
+                  <a:txBody>
+                    <a:bodyPr/>
+                    <a:lstStyle/>
+                    <a:p>
+                      <a:pPr algn="ctr"/>
+                      <a:r>
+                        <a:rPr lang="en-US" sz="3600" dirty="0"/>
+                        <a:t>Link</a:t>
+                      </a:r>
+                    </a:p>
+                  </a:txBody>
+                  <a:tcPr anchor="ctr"/>
+                </a:tc>
+                <a:extLst>
+                  <a:ext uri="{0D108BD9-81ED-4DB2-BD59-A6C34878D82A}">
+                    <a16:rowId xmlns:a16="http://schemas.microsoft.com/office/drawing/2014/main" val="4236963248"/>
+                  </a:ext>
+                </a:extLst>
+              </a:tr>
+              <a:tr h="1968441">
+                <a:tc>
+                  <a:txBody>
+                    <a:bodyPr/>
+                    <a:lstStyle/>
+                    <a:p>
+                      <a:r>
+                        <a:rPr lang="en-US" sz="3600" dirty="0"/>
+                        <a:t>Demo Artefacts</a:t>
+                      </a:r>
+                    </a:p>
+                  </a:txBody>
+                  <a:tcPr anchor="ctr"/>
+                </a:tc>
+                <a:tc>
+                  <a:txBody>
+                    <a:bodyPr/>
+                    <a:lstStyle/>
+                    <a:p>
+                      <a:endParaRPr lang="en-US" sz="3600" dirty="0"/>
+                    </a:p>
+                  </a:txBody>
+                  <a:tcPr anchor="ctr"/>
+                </a:tc>
+                <a:tc>
+                  <a:txBody>
+                    <a:bodyPr/>
+                    <a:lstStyle/>
+                    <a:p>
+                      <a:pPr marL="0" marR="0" indent="0" algn="l" defTabSz="914400" rtl="0" eaLnBrk="1" fontAlgn="auto" latinLnBrk="0" hangingPunct="1">
+                        <a:lnSpc>
+                          <a:spcPct val="100000"/>
+                        </a:lnSpc>
+                        <a:spcBef>
+                          <a:spcPts val="0"/>
+                        </a:spcBef>
+                        <a:spcAft>
+                          <a:spcPts val="0"/>
+                        </a:spcAft>
+                        <a:buClrTx/>
+                        <a:buSzTx/>
+                        <a:buFontTx/>
+                        <a:buNone/>
+                        <a:tabLst/>
+                        <a:defRPr/>
+                      </a:pPr>
+                      <a:r>
+                        <a:rPr lang="en-US" sz="3200" dirty="0"/>
+                        <a:t>a-um.me/pune2024-repo</a:t>
+                      </a:r>
+                    </a:p>
+                  </a:txBody>
+                  <a:tcPr anchor="ctr"/>
+                </a:tc>
+                <a:extLst>
+                  <a:ext uri="{0D108BD9-81ED-4DB2-BD59-A6C34878D82A}">
+                    <a16:rowId xmlns:a16="http://schemas.microsoft.com/office/drawing/2014/main" val="665271325"/>
+                  </a:ext>
+                </a:extLst>
+              </a:tr>
+              <a:tr h="1968441">
+                <a:tc>
+                  <a:txBody>
+                    <a:bodyPr/>
+                    <a:lstStyle/>
+                    <a:p>
+                      <a:r>
+                        <a:rPr lang="en-US" sz="3600" dirty="0"/>
+                        <a:t>References / Links</a:t>
+                      </a:r>
+                    </a:p>
+                  </a:txBody>
+                  <a:tcPr anchor="ctr"/>
+                </a:tc>
+                <a:tc>
+                  <a:txBody>
+                    <a:bodyPr/>
+                    <a:lstStyle/>
+                    <a:p>
+                      <a:endParaRPr lang="en-US" sz="3600" dirty="0"/>
+                    </a:p>
+                  </a:txBody>
+                  <a:tcPr anchor="ctr"/>
+                </a:tc>
+                <a:tc>
+                  <a:txBody>
+                    <a:bodyPr/>
+                    <a:lstStyle/>
+                    <a:p>
+                      <a:endParaRPr lang="en-US" sz="3600" dirty="0"/>
+                    </a:p>
+                  </a:txBody>
+                  <a:tcPr anchor="ctr"/>
+                </a:tc>
+                <a:extLst>
+                  <a:ext uri="{0D108BD9-81ED-4DB2-BD59-A6C34878D82A}">
+                    <a16:rowId xmlns:a16="http://schemas.microsoft.com/office/drawing/2014/main" val="1890980864"/>
+                  </a:ext>
+                </a:extLst>
+              </a:tr>
+            </a:tbl>
+          </a:graphicData>
+        </a:graphic>
+      </p:graphicFrame>
+      <p:pic>
+        <p:nvPicPr>
+          <p:cNvPr id="2050" name="Picture 2" descr="qr-code">
+            <a:extLst>
+              <a:ext uri="{FF2B5EF4-FFF2-40B4-BE49-F238E27FC236}">
+                <a16:creationId xmlns:a16="http://schemas.microsoft.com/office/drawing/2014/main" id="{65448CA9-DBA1-2DD3-5D96-A65B77B96946}"/>
+              </a:ext>
+            </a:extLst>
+          </p:cNvPr>
+          <p:cNvPicPr>
+            <a:picLocks noChangeAspect="1" noChangeArrowheads="1"/>
+          </p:cNvPicPr>
+          <p:nvPr/>
+        </p:nvPicPr>
+        <p:blipFill>
+          <a:blip r:embed="rId2">
+            <a:extLst>
+              <a:ext uri="{28A0092B-C50C-407E-A947-70E740481C1C}">
+                <a14:useLocalDpi xmlns:a14="http://schemas.microsoft.com/office/drawing/2010/main" val="0"/>
+              </a:ext>
+            </a:extLst>
+          </a:blip>
+          <a:srcRect/>
+          <a:stretch>
+            <a:fillRect/>
+          </a:stretch>
+        </p:blipFill>
+        <p:spPr bwMode="auto">
+          <a:xfrm>
+            <a:off x="5143500" y="1909830"/>
+            <a:ext cx="1905000" cy="1905000"/>
+          </a:xfrm>
+          <a:prstGeom prst="rect">
+            <a:avLst/>
+          </a:prstGeom>
+          <a:noFill/>
+          <a:extLst>
+            <a:ext uri="{909E8E84-426E-40DD-AFC4-6F175D3DCCD1}">
+              <a14:hiddenFill xmlns:a14="http://schemas.microsoft.com/office/drawing/2010/main">
+                <a:solidFill>
+                  <a:srgbClr val="FFFFFF"/>
+                </a:solidFill>
+              </a14:hiddenFill>
+            </a:ext>
+          </a:extLst>
+        </p:spPr>
+      </p:pic>
     </p:spTree>
     <p:extLst>
       <p:ext uri="{BB962C8B-B14F-4D97-AF65-F5344CB8AC3E}">
-        <p14:creationId xmlns:p14="http://schemas.microsoft.com/office/powerpoint/2010/main" val="1683390843"/>
+        <p14:creationId xmlns:p14="http://schemas.microsoft.com/office/powerpoint/2010/main" val="2067572601"/>
       </p:ext>
     </p:extLst>
   </p:cSld>
   <p:clrMapOvr>
     <a:masterClrMapping/>
   </p:clrMapOvr>
-  <mc:AlternateContent xmlns:mc="http://schemas.openxmlformats.org/markup-compatibility/2006" xmlns:p14="http://schemas.microsoft.com/office/powerpoint/2010/main">
-    <mc:Choice Requires="p14">
-      <p:transition spd="med" p14:dur="700">
-        <p:fade/>
-      </p:transition>
-    </mc:Choice>
-    <mc:Fallback xmlns="">
-      <p:transition spd="med">
-        <p:fade/>
-      </p:transition>
-    </mc:Fallback>
-  </mc:AlternateContent>
 </p:sld>
 </file>
 
@@ -9313,6 +9784,15 @@
 </file>
 
 <file path=customXml/item1.xml><?xml version="1.0" encoding="utf-8"?>
+<?mso-contentType ?>
+<FormTemplates xmlns="http://schemas.microsoft.com/sharepoint/v3/contenttype/forms">
+  <Display>DocumentLibraryForm</Display>
+  <Edit>DocumentLibraryForm</Edit>
+  <New>DocumentLibraryForm</New>
+</FormTemplates>
+</file>
+
+<file path=customXml/item2.xml><?xml version="1.0" encoding="utf-8"?>
 <ct:contentTypeSchema xmlns:ct="http://schemas.microsoft.com/office/2006/metadata/contentType" xmlns:ma="http://schemas.microsoft.com/office/2006/metadata/properties/metaAttributes" ct:_="" ma:_="" ma:contentTypeName="Document" ma:contentTypeID="0x010100B4F00FA3E7003141BC16E026FCE150A0" ma:contentTypeVersion="14" ma:contentTypeDescription="Create a new document." ma:contentTypeScope="" ma:versionID="cd6f1e720285b57b5d5543e2ca3f0057">
   <xsd:schema xmlns:xsd="http://www.w3.org/2001/XMLSchema" xmlns:xs="http://www.w3.org/2001/XMLSchema" xmlns:p="http://schemas.microsoft.com/office/2006/metadata/properties" xmlns:ns2="30a061b1-bdb8-4664-ad9e-272301b45d52" xmlns:ns3="ea3e4b80-20a0-46c1-93e7-c2ea17da9740" targetNamespace="http://schemas.microsoft.com/office/2006/metadata/properties" ma:root="true" ma:fieldsID="9017f70464279b2d5c8597f95853a917" ns2:_="" ns3:_="">
     <xsd:import namespace="30a061b1-bdb8-4664-ad9e-272301b45d52"/>
@@ -9519,15 +9999,6 @@
 </ct:contentTypeSchema>
 </file>
 
-<file path=customXml/item2.xml><?xml version="1.0" encoding="utf-8"?>
-<?mso-contentType ?>
-<FormTemplates xmlns="http://schemas.microsoft.com/sharepoint/v3/contenttype/forms">
-  <Display>DocumentLibraryForm</Display>
-  <Edit>DocumentLibraryForm</Edit>
-  <New>DocumentLibraryForm</New>
-</FormTemplates>
-</file>
-
 <file path=customXml/item3.xml><?xml version="1.0" encoding="utf-8"?>
 <p:properties xmlns:p="http://schemas.microsoft.com/office/2006/metadata/properties" xmlns:xsi="http://www.w3.org/2001/XMLSchema-instance" xmlns:pc="http://schemas.microsoft.com/office/infopath/2007/PartnerControls">
   <documentManagement>
@@ -9540,6 +10011,14 @@
 </file>
 
 <file path=customXml/itemProps1.xml><?xml version="1.0" encoding="utf-8"?>
+<ds:datastoreItem xmlns:ds="http://schemas.openxmlformats.org/officeDocument/2006/customXml" ds:itemID="{D00C3A8D-3909-48B8-AD16-00959621AB37}">
+  <ds:schemaRefs>
+    <ds:schemaRef ds:uri="http://schemas.microsoft.com/sharepoint/v3/contenttype/forms"/>
+  </ds:schemaRefs>
+</ds:datastoreItem>
+</file>
+
+<file path=customXml/itemProps2.xml><?xml version="1.0" encoding="utf-8"?>
 <ds:datastoreItem xmlns:ds="http://schemas.openxmlformats.org/officeDocument/2006/customXml" ds:itemID="{1E5FD590-0F7B-4E1C-836A-EFC04C095CF4}">
   <ds:schemaRefs>
     <ds:schemaRef ds:uri="http://schemas.microsoft.com/office/2006/metadata/contentType"/>
@@ -9558,14 +10037,6 @@
 </ds:datastoreItem>
 </file>
 
-<file path=customXml/itemProps2.xml><?xml version="1.0" encoding="utf-8"?>
-<ds:datastoreItem xmlns:ds="http://schemas.openxmlformats.org/officeDocument/2006/customXml" ds:itemID="{D00C3A8D-3909-48B8-AD16-00959621AB37}">
-  <ds:schemaRefs>
-    <ds:schemaRef ds:uri="http://schemas.microsoft.com/sharepoint/v3/contenttype/forms"/>
-  </ds:schemaRefs>
-</ds:datastoreItem>
-</file>
-
 <file path=customXml/itemProps3.xml><?xml version="1.0" encoding="utf-8"?>
 <ds:datastoreItem xmlns:ds="http://schemas.openxmlformats.org/officeDocument/2006/customXml" ds:itemID="{BA9D4A8B-C6CB-443E-8607-734A65901095}">
   <ds:schemaRefs>

</xml_diff>

<commit_message>
Updated deck with feedback and Repo
</commit_message>
<xml_diff>
--- a/deck/M365DevProxy - Arjun Menon.pptx
+++ b/deck/M365DevProxy - Arjun Menon.pptx
@@ -7099,41 +7099,8 @@
         </p:nvSpPr>
         <p:spPr>
           <a:xfrm>
-            <a:off x="839787" y="128788"/>
-            <a:ext cx="3932237" cy="576330"/>
-          </a:xfrm>
-        </p:spPr>
-        <p:txBody>
-          <a:bodyPr/>
-          <a:lstStyle/>
-          <a:p>
-            <a:r>
-              <a:rPr lang="en-US" dirty="0"/>
-              <a:t>Feedback</a:t>
-            </a:r>
-          </a:p>
-        </p:txBody>
-      </p:sp>
-      <p:sp>
-        <p:nvSpPr>
-          <p:cNvPr id="5" name="Text Placeholder 4">
-            <a:extLst>
-              <a:ext uri="{FF2B5EF4-FFF2-40B4-BE49-F238E27FC236}">
-                <a16:creationId xmlns:a16="http://schemas.microsoft.com/office/drawing/2014/main" id="{08C2879E-926D-B489-D2F6-DD7652FE82E0}"/>
-              </a:ext>
-            </a:extLst>
-          </p:cNvPr>
-          <p:cNvSpPr>
-            <a:spLocks noGrp="1"/>
-          </p:cNvSpPr>
-          <p:nvPr>
-            <p:ph type="body" sz="half" idx="2"/>
-          </p:nvPr>
-        </p:nvSpPr>
-        <p:spPr>
-          <a:xfrm>
-            <a:off x="556453" y="2730320"/>
-            <a:ext cx="4852674" cy="698679"/>
+            <a:off x="839787" y="128787"/>
+            <a:ext cx="4839796" cy="862885"/>
           </a:xfrm>
         </p:spPr>
         <p:txBody>
@@ -7143,18 +7110,59 @@
           <a:lstStyle/>
           <a:p>
             <a:r>
+              <a:rPr lang="en-US" sz="4800" dirty="0"/>
+              <a:t>Feedback ❤️</a:t>
+            </a:r>
+          </a:p>
+        </p:txBody>
+      </p:sp>
+      <p:sp>
+        <p:nvSpPr>
+          <p:cNvPr id="5" name="Text Placeholder 4">
+            <a:extLst>
+              <a:ext uri="{FF2B5EF4-FFF2-40B4-BE49-F238E27FC236}">
+                <a16:creationId xmlns:a16="http://schemas.microsoft.com/office/drawing/2014/main" id="{08C2879E-926D-B489-D2F6-DD7652FE82E0}"/>
+              </a:ext>
+            </a:extLst>
+          </p:cNvPr>
+          <p:cNvSpPr>
+            <a:spLocks noGrp="1"/>
+          </p:cNvSpPr>
+          <p:nvPr>
+            <p:ph type="body" sz="half" idx="2"/>
+          </p:nvPr>
+        </p:nvSpPr>
+        <p:spPr>
+          <a:xfrm>
+            <a:off x="479180" y="2851327"/>
+            <a:ext cx="5805710" cy="698679"/>
+          </a:xfrm>
+        </p:spPr>
+        <p:txBody>
+          <a:bodyPr>
+            <a:normAutofit fontScale="92500"/>
+          </a:bodyPr>
+          <a:lstStyle/>
+          <a:p>
+            <a:r>
+              <a:rPr lang="en-US" sz="2800" dirty="0">
+                <a:hlinkClick r:id="rId2"/>
+              </a:rPr>
+              <a:t>https://a-um.me/pune2024-feedback</a:t>
+            </a:r>
+            <a:r>
               <a:rPr lang="en-US" sz="2800" dirty="0"/>
-              <a:t>a-um.me/pune2024-repo</a:t>
+              <a:t> </a:t>
             </a:r>
           </a:p>
         </p:txBody>
       </p:sp>
       <p:pic>
         <p:nvPicPr>
-          <p:cNvPr id="1028" name="Picture 4" descr="qr-code">
-            <a:extLst>
-              <a:ext uri="{FF2B5EF4-FFF2-40B4-BE49-F238E27FC236}">
-                <a16:creationId xmlns:a16="http://schemas.microsoft.com/office/drawing/2014/main" id="{5C2295F7-A514-4A3C-7D4E-81795F9EF0F9}"/>
+          <p:cNvPr id="2050" name="Picture 2" descr="qr-code">
+            <a:extLst>
+              <a:ext uri="{FF2B5EF4-FFF2-40B4-BE49-F238E27FC236}">
+                <a16:creationId xmlns:a16="http://schemas.microsoft.com/office/drawing/2014/main" id="{568C387C-60B9-A42B-C534-C79C3B206A40}"/>
               </a:ext>
             </a:extLst>
           </p:cNvPr>
@@ -7164,7 +7172,7 @@
           <p:nvPr/>
         </p:nvPicPr>
         <p:blipFill>
-          <a:blip r:embed="rId2">
+          <a:blip r:embed="rId3">
             <a:extLst>
               <a:ext uri="{28A0092B-C50C-407E-A947-70E740481C1C}">
                 <a14:useLocalDpi xmlns:a14="http://schemas.microsoft.com/office/drawing/2010/main" val="0"/>
@@ -7178,8 +7186,8 @@
         </p:blipFill>
         <p:spPr bwMode="auto">
           <a:xfrm>
-            <a:off x="5794607" y="1109726"/>
-            <a:ext cx="4638547" cy="4638547"/>
+            <a:off x="6611691" y="1356574"/>
+            <a:ext cx="4386865" cy="4386865"/>
           </a:xfrm>
           <a:prstGeom prst="rect">
             <a:avLst/>
@@ -7206,13 +7214,13 @@
   <p:clrMapOvr>
     <a:masterClrMapping/>
   </p:clrMapOvr>
-  <mc:AlternateContent xmlns:mc="http://schemas.openxmlformats.org/markup-compatibility/2006">
-    <mc:Choice xmlns:p14="http://schemas.microsoft.com/office/powerpoint/2010/main" Requires="p14">
+  <mc:AlternateContent xmlns:mc="http://schemas.openxmlformats.org/markup-compatibility/2006" xmlns:p14="http://schemas.microsoft.com/office/powerpoint/2010/main">
+    <mc:Choice Requires="p14">
       <p:transition spd="med" p14:dur="700">
         <p:fade/>
       </p:transition>
     </mc:Choice>
-    <mc:Fallback>
+    <mc:Fallback xmlns="">
       <p:transition spd="med">
         <p:fade/>
       </p:transition>
@@ -8647,7 +8655,7 @@
             <p:ph idx="1"/>
             <p:extLst>
               <p:ext uri="{D42A27DB-BD31-4B8C-83A1-F6EECF244321}">
-                <p14:modId xmlns:p14="http://schemas.microsoft.com/office/powerpoint/2010/main" val="980397498"/>
+                <p14:modId xmlns:p14="http://schemas.microsoft.com/office/powerpoint/2010/main" val="1335053964"/>
               </p:ext>
             </p:extLst>
           </p:nvPr>
@@ -8694,7 +8702,7 @@
                       <a:pPr algn="ctr"/>
                       <a:r>
                         <a:rPr lang="en-US" sz="3600" dirty="0"/>
-                        <a:t>Reference</a:t>
+                        <a:t>Item</a:t>
                       </a:r>
                     </a:p>
                   </a:txBody>
@@ -8781,8 +8789,14 @@
                         <a:defRPr/>
                       </a:pPr>
                       <a:r>
-                        <a:rPr lang="en-US" sz="3200" dirty="0"/>
-                        <a:t>a-um.me/pune2024-repo</a:t>
+                        <a:rPr lang="en-US" sz="2400" dirty="0">
+                          <a:hlinkClick r:id="rId2"/>
+                        </a:rPr>
+                        <a:t>https://a-um.me/pune2024-repo</a:t>
+                      </a:r>
+                      <a:r>
+                        <a:rPr lang="en-US" sz="2400" dirty="0"/>
+                        <a:t> </a:t>
                       </a:r>
                     </a:p>
                   </a:txBody>
@@ -8823,7 +8837,16 @@
                     <a:bodyPr/>
                     <a:lstStyle/>
                     <a:p>
-                      <a:endParaRPr lang="en-US" sz="3600" dirty="0"/>
+                      <a:r>
+                        <a:rPr lang="en-US" sz="2400" dirty="0">
+                          <a:hlinkClick r:id="rId3"/>
+                        </a:rPr>
+                        <a:t>https://a-um.me/pune2024-reference</a:t>
+                      </a:r>
+                      <a:r>
+                        <a:rPr lang="en-US" sz="2400" dirty="0"/>
+                        <a:t> </a:t>
+                      </a:r>
                     </a:p>
                   </a:txBody>
                   <a:tcPr anchor="ctr"/>
@@ -8853,7 +8876,7 @@
           <p:nvPr/>
         </p:nvPicPr>
         <p:blipFill>
-          <a:blip r:embed="rId2">
+          <a:blip r:embed="rId4">
             <a:extLst>
               <a:ext uri="{28A0092B-C50C-407E-A947-70E740481C1C}">
                 <a14:useLocalDpi xmlns:a14="http://schemas.microsoft.com/office/drawing/2010/main" val="0"/>
@@ -8885,6 +8908,53 @@
           </a:extLst>
         </p:spPr>
       </p:pic>
+      <p:pic>
+        <p:nvPicPr>
+          <p:cNvPr id="1026" name="Picture 2" descr="qr-code">
+            <a:extLst>
+              <a:ext uri="{FF2B5EF4-FFF2-40B4-BE49-F238E27FC236}">
+                <a16:creationId xmlns:a16="http://schemas.microsoft.com/office/drawing/2014/main" id="{2AA85B79-B195-3111-1DDC-9CD607E74932}"/>
+              </a:ext>
+            </a:extLst>
+          </p:cNvPr>
+          <p:cNvPicPr>
+            <a:picLocks noChangeAspect="1" noChangeArrowheads="1"/>
+          </p:cNvPicPr>
+          <p:nvPr/>
+        </p:nvPicPr>
+        <p:blipFill>
+          <a:blip r:embed="rId5">
+            <a:extLst>
+              <a:ext uri="{28A0092B-C50C-407E-A947-70E740481C1C}">
+                <a14:useLocalDpi xmlns:a14="http://schemas.microsoft.com/office/drawing/2010/main" val="0"/>
+              </a:ext>
+            </a:extLst>
+          </a:blip>
+          <a:srcRect/>
+          <a:stretch>
+            <a:fillRect/>
+          </a:stretch>
+        </p:blipFill>
+        <p:spPr bwMode="auto">
+          <a:xfrm>
+            <a:off x="5143500" y="3924500"/>
+            <a:ext cx="1905000" cy="1905000"/>
+          </a:xfrm>
+          <a:prstGeom prst="rect">
+            <a:avLst/>
+          </a:prstGeom>
+          <a:noFill/>
+          <a:extLst>
+            <a:ext uri="{909E8E84-426E-40DD-AFC4-6F175D3DCCD1}">
+              <a14:hiddenFill xmlns:a14="http://schemas.microsoft.com/office/drawing/2010/main">
+                <a:solidFill>
+                  <a:srgbClr val="FFFFFF"/>
+                </a:solidFill>
+              </a14:hiddenFill>
+            </a:ext>
+          </a:extLst>
+        </p:spPr>
+      </p:pic>
     </p:spTree>
     <p:extLst>
       <p:ext uri="{BB962C8B-B14F-4D97-AF65-F5344CB8AC3E}">
@@ -8895,6 +8965,18 @@
   <p:clrMapOvr>
     <a:masterClrMapping/>
   </p:clrMapOvr>
+  <mc:AlternateContent xmlns:mc="http://schemas.openxmlformats.org/markup-compatibility/2006">
+    <mc:Choice xmlns:p14="http://schemas.microsoft.com/office/powerpoint/2010/main" Requires="p14">
+      <p:transition spd="med" p14:dur="700">
+        <p:fade/>
+      </p:transition>
+    </mc:Choice>
+    <mc:Fallback>
+      <p:transition spd="med">
+        <p:fade/>
+      </p:transition>
+    </mc:Fallback>
+  </mc:AlternateContent>
 </p:sld>
 </file>
 
@@ -9793,6 +9875,17 @@
 </file>
 
 <file path=customXml/item2.xml><?xml version="1.0" encoding="utf-8"?>
+<p:properties xmlns:p="http://schemas.microsoft.com/office/2006/metadata/properties" xmlns:xsi="http://www.w3.org/2001/XMLSchema-instance" xmlns:pc="http://schemas.microsoft.com/office/infopath/2007/PartnerControls">
+  <documentManagement>
+    <lcf76f155ced4ddcb4097134ff3c332f xmlns="30a061b1-bdb8-4664-ad9e-272301b45d52">
+      <Terms xmlns="http://schemas.microsoft.com/office/infopath/2007/PartnerControls"/>
+    </lcf76f155ced4ddcb4097134ff3c332f>
+    <TaxCatchAll xmlns="ea3e4b80-20a0-46c1-93e7-c2ea17da9740" xsi:nil="true"/>
+  </documentManagement>
+</p:properties>
+</file>
+
+<file path=customXml/item3.xml><?xml version="1.0" encoding="utf-8"?>
 <ct:contentTypeSchema xmlns:ct="http://schemas.microsoft.com/office/2006/metadata/contentType" xmlns:ma="http://schemas.microsoft.com/office/2006/metadata/properties/metaAttributes" ct:_="" ma:_="" ma:contentTypeName="Document" ma:contentTypeID="0x010100B4F00FA3E7003141BC16E026FCE150A0" ma:contentTypeVersion="14" ma:contentTypeDescription="Create a new document." ma:contentTypeScope="" ma:versionID="cd6f1e720285b57b5d5543e2ca3f0057">
   <xsd:schema xmlns:xsd="http://www.w3.org/2001/XMLSchema" xmlns:xs="http://www.w3.org/2001/XMLSchema" xmlns:p="http://schemas.microsoft.com/office/2006/metadata/properties" xmlns:ns2="30a061b1-bdb8-4664-ad9e-272301b45d52" xmlns:ns3="ea3e4b80-20a0-46c1-93e7-c2ea17da9740" targetNamespace="http://schemas.microsoft.com/office/2006/metadata/properties" ma:root="true" ma:fieldsID="9017f70464279b2d5c8597f95853a917" ns2:_="" ns3:_="">
     <xsd:import namespace="30a061b1-bdb8-4664-ad9e-272301b45d52"/>
@@ -9999,17 +10092,6 @@
 </ct:contentTypeSchema>
 </file>
 
-<file path=customXml/item3.xml><?xml version="1.0" encoding="utf-8"?>
-<p:properties xmlns:p="http://schemas.microsoft.com/office/2006/metadata/properties" xmlns:xsi="http://www.w3.org/2001/XMLSchema-instance" xmlns:pc="http://schemas.microsoft.com/office/infopath/2007/PartnerControls">
-  <documentManagement>
-    <lcf76f155ced4ddcb4097134ff3c332f xmlns="30a061b1-bdb8-4664-ad9e-272301b45d52">
-      <Terms xmlns="http://schemas.microsoft.com/office/infopath/2007/PartnerControls"/>
-    </lcf76f155ced4ddcb4097134ff3c332f>
-    <TaxCatchAll xmlns="ea3e4b80-20a0-46c1-93e7-c2ea17da9740" xsi:nil="true"/>
-  </documentManagement>
-</p:properties>
-</file>
-
 <file path=customXml/itemProps1.xml><?xml version="1.0" encoding="utf-8"?>
 <ds:datastoreItem xmlns:ds="http://schemas.openxmlformats.org/officeDocument/2006/customXml" ds:itemID="{D00C3A8D-3909-48B8-AD16-00959621AB37}">
   <ds:schemaRefs>
@@ -10019,6 +10101,17 @@
 </file>
 
 <file path=customXml/itemProps2.xml><?xml version="1.0" encoding="utf-8"?>
+<ds:datastoreItem xmlns:ds="http://schemas.openxmlformats.org/officeDocument/2006/customXml" ds:itemID="{BA9D4A8B-C6CB-443E-8607-734A65901095}">
+  <ds:schemaRefs>
+    <ds:schemaRef ds:uri="http://schemas.microsoft.com/office/2006/metadata/properties"/>
+    <ds:schemaRef ds:uri="http://schemas.microsoft.com/office/infopath/2007/PartnerControls"/>
+    <ds:schemaRef ds:uri="30a061b1-bdb8-4664-ad9e-272301b45d52"/>
+    <ds:schemaRef ds:uri="ea3e4b80-20a0-46c1-93e7-c2ea17da9740"/>
+  </ds:schemaRefs>
+</ds:datastoreItem>
+</file>
+
+<file path=customXml/itemProps3.xml><?xml version="1.0" encoding="utf-8"?>
 <ds:datastoreItem xmlns:ds="http://schemas.openxmlformats.org/officeDocument/2006/customXml" ds:itemID="{1E5FD590-0F7B-4E1C-836A-EFC04C095CF4}">
   <ds:schemaRefs>
     <ds:schemaRef ds:uri="http://schemas.microsoft.com/office/2006/metadata/contentType"/>
@@ -10035,15 +10128,4 @@
     <ds:schemaRef ds:uri="http://schemas.microsoft.com/internal/obd"/>
   </ds:schemaRefs>
 </ds:datastoreItem>
-</file>
-
-<file path=customXml/itemProps3.xml><?xml version="1.0" encoding="utf-8"?>
-<ds:datastoreItem xmlns:ds="http://schemas.openxmlformats.org/officeDocument/2006/customXml" ds:itemID="{BA9D4A8B-C6CB-443E-8607-734A65901095}">
-  <ds:schemaRefs>
-    <ds:schemaRef ds:uri="http://schemas.microsoft.com/office/2006/metadata/properties"/>
-    <ds:schemaRef ds:uri="http://schemas.microsoft.com/office/infopath/2007/PartnerControls"/>
-    <ds:schemaRef ds:uri="30a061b1-bdb8-4664-ad9e-272301b45d52"/>
-    <ds:schemaRef ds:uri="ea3e4b80-20a0-46c1-93e7-c2ea17da9740"/>
-  </ds:schemaRefs>
-</ds:datastoreItem>
 </file>
</xml_diff>